<commit_message>
pronto a apresentação para a Ana Estela
</commit_message>
<xml_diff>
--- a/Estudo/Orientação - Agrupamento de Consenso.pptx
+++ b/Estudo/Orientação - Agrupamento de Consenso.pptx
@@ -16,6 +16,9 @@
     <p:sldId id="263" r:id="rId10"/>
     <p:sldId id="264" r:id="rId11"/>
     <p:sldId id="266" r:id="rId12"/>
+    <p:sldId id="268" r:id="rId13"/>
+    <p:sldId id="269" r:id="rId14"/>
+    <p:sldId id="270" r:id="rId15"/>
   </p:sldIdLst>
   <p:sldSz cx="12192000" cy="6858000"/>
   <p:notesSz cx="6858000" cy="9144000"/>
@@ -253,7 +256,7 @@
           <a:p>
             <a:fld id="{FBA4CB17-6D6B-4A07-A83E-56462B547627}" type="datetimeFigureOut">
               <a:rPr lang="pt-BR" smtClean="0"/>
-              <a:t>05/08/2018</a:t>
+              <a:t>06/08/2018</a:t>
             </a:fld>
             <a:endParaRPr lang="pt-BR"/>
           </a:p>
@@ -423,7 +426,7 @@
           <a:p>
             <a:fld id="{FBA4CB17-6D6B-4A07-A83E-56462B547627}" type="datetimeFigureOut">
               <a:rPr lang="pt-BR" smtClean="0"/>
-              <a:t>05/08/2018</a:t>
+              <a:t>06/08/2018</a:t>
             </a:fld>
             <a:endParaRPr lang="pt-BR"/>
           </a:p>
@@ -603,7 +606,7 @@
           <a:p>
             <a:fld id="{FBA4CB17-6D6B-4A07-A83E-56462B547627}" type="datetimeFigureOut">
               <a:rPr lang="pt-BR" smtClean="0"/>
-              <a:t>05/08/2018</a:t>
+              <a:t>06/08/2018</a:t>
             </a:fld>
             <a:endParaRPr lang="pt-BR"/>
           </a:p>
@@ -773,7 +776,7 @@
           <a:p>
             <a:fld id="{FBA4CB17-6D6B-4A07-A83E-56462B547627}" type="datetimeFigureOut">
               <a:rPr lang="pt-BR" smtClean="0"/>
-              <a:t>05/08/2018</a:t>
+              <a:t>06/08/2018</a:t>
             </a:fld>
             <a:endParaRPr lang="pt-BR"/>
           </a:p>
@@ -1019,7 +1022,7 @@
           <a:p>
             <a:fld id="{FBA4CB17-6D6B-4A07-A83E-56462B547627}" type="datetimeFigureOut">
               <a:rPr lang="pt-BR" smtClean="0"/>
-              <a:t>05/08/2018</a:t>
+              <a:t>06/08/2018</a:t>
             </a:fld>
             <a:endParaRPr lang="pt-BR"/>
           </a:p>
@@ -1251,7 +1254,7 @@
           <a:p>
             <a:fld id="{FBA4CB17-6D6B-4A07-A83E-56462B547627}" type="datetimeFigureOut">
               <a:rPr lang="pt-BR" smtClean="0"/>
-              <a:t>05/08/2018</a:t>
+              <a:t>06/08/2018</a:t>
             </a:fld>
             <a:endParaRPr lang="pt-BR"/>
           </a:p>
@@ -1618,7 +1621,7 @@
           <a:p>
             <a:fld id="{FBA4CB17-6D6B-4A07-A83E-56462B547627}" type="datetimeFigureOut">
               <a:rPr lang="pt-BR" smtClean="0"/>
-              <a:t>05/08/2018</a:t>
+              <a:t>06/08/2018</a:t>
             </a:fld>
             <a:endParaRPr lang="pt-BR"/>
           </a:p>
@@ -1736,7 +1739,7 @@
           <a:p>
             <a:fld id="{FBA4CB17-6D6B-4A07-A83E-56462B547627}" type="datetimeFigureOut">
               <a:rPr lang="pt-BR" smtClean="0"/>
-              <a:t>05/08/2018</a:t>
+              <a:t>06/08/2018</a:t>
             </a:fld>
             <a:endParaRPr lang="pt-BR"/>
           </a:p>
@@ -1831,7 +1834,7 @@
           <a:p>
             <a:fld id="{FBA4CB17-6D6B-4A07-A83E-56462B547627}" type="datetimeFigureOut">
               <a:rPr lang="pt-BR" smtClean="0"/>
-              <a:t>05/08/2018</a:t>
+              <a:t>06/08/2018</a:t>
             </a:fld>
             <a:endParaRPr lang="pt-BR"/>
           </a:p>
@@ -2108,7 +2111,7 @@
           <a:p>
             <a:fld id="{FBA4CB17-6D6B-4A07-A83E-56462B547627}" type="datetimeFigureOut">
               <a:rPr lang="pt-BR" smtClean="0"/>
-              <a:t>05/08/2018</a:t>
+              <a:t>06/08/2018</a:t>
             </a:fld>
             <a:endParaRPr lang="pt-BR"/>
           </a:p>
@@ -2361,7 +2364,7 @@
           <a:p>
             <a:fld id="{FBA4CB17-6D6B-4A07-A83E-56462B547627}" type="datetimeFigureOut">
               <a:rPr lang="pt-BR" smtClean="0"/>
-              <a:t>05/08/2018</a:t>
+              <a:t>06/08/2018</a:t>
             </a:fld>
             <a:endParaRPr lang="pt-BR"/>
           </a:p>
@@ -2574,7 +2577,7 @@
           <a:p>
             <a:fld id="{FBA4CB17-6D6B-4A07-A83E-56462B547627}" type="datetimeFigureOut">
               <a:rPr lang="pt-BR" smtClean="0"/>
-              <a:t>05/08/2018</a:t>
+              <a:t>06/08/2018</a:t>
             </a:fld>
             <a:endParaRPr lang="pt-BR"/>
           </a:p>
@@ -3717,29 +3720,96 @@
           <a:bodyPr/>
           <a:lstStyle/>
           <a:p>
-            <a:endParaRPr lang="pt-BR"/>
-          </a:p>
-        </p:txBody>
-      </p:sp>
-      <p:sp>
-        <p:nvSpPr>
-          <p:cNvPr id="3" name="Espaço Reservado para Conteúdo 2"/>
-          <p:cNvSpPr>
-            <a:spLocks noGrp="1"/>
-          </p:cNvSpPr>
+            <a:r>
+              <a:rPr lang="pt-BR" dirty="0" err="1" smtClean="0"/>
+              <a:t>Algorithms</a:t>
+            </a:r>
+            <a:r>
+              <a:rPr lang="pt-BR" dirty="0" smtClean="0"/>
+              <a:t> </a:t>
+            </a:r>
+            <a:r>
+              <a:rPr lang="pt-BR" dirty="0"/>
+              <a:t>= c("km","</a:t>
+            </a:r>
+            <a:r>
+              <a:rPr lang="pt-BR" dirty="0" err="1"/>
+              <a:t>pam</a:t>
+            </a:r>
+            <a:r>
+              <a:rPr lang="pt-BR" dirty="0"/>
+              <a:t>","</a:t>
+            </a:r>
+            <a:r>
+              <a:rPr lang="pt-BR" dirty="0" err="1"/>
+              <a:t>diana</a:t>
+            </a:r>
+            <a:r>
+              <a:rPr lang="pt-BR" dirty="0"/>
+              <a:t>")</a:t>
+            </a:r>
+          </a:p>
+        </p:txBody>
+      </p:sp>
+      <p:pic>
+        <p:nvPicPr>
+          <p:cNvPr id="4" name="Espaço Reservado para Conteúdo 3" descr="Recorte de Tela"/>
+          <p:cNvPicPr>
+            <a:picLocks noGrp="1" noChangeAspect="1"/>
+          </p:cNvPicPr>
           <p:nvPr>
             <p:ph idx="1"/>
           </p:nvPr>
-        </p:nvSpPr>
-        <p:spPr/>
-        <p:txBody>
-          <a:bodyPr/>
-          <a:lstStyle/>
-          <a:p>
-            <a:endParaRPr lang="pt-BR"/>
-          </a:p>
-        </p:txBody>
-      </p:sp>
+        </p:nvPicPr>
+        <p:blipFill>
+          <a:blip r:embed="rId2">
+            <a:extLst>
+              <a:ext uri="{28A0092B-C50C-407E-A947-70E740481C1C}">
+                <a14:useLocalDpi xmlns:a14="http://schemas.microsoft.com/office/drawing/2010/main" val="0"/>
+              </a:ext>
+            </a:extLst>
+          </a:blip>
+          <a:stretch>
+            <a:fillRect/>
+          </a:stretch>
+        </p:blipFill>
+        <p:spPr>
+          <a:xfrm>
+            <a:off x="326494" y="2346235"/>
+            <a:ext cx="11865506" cy="1352308"/>
+          </a:xfrm>
+        </p:spPr>
+      </p:pic>
+      <p:pic>
+        <p:nvPicPr>
+          <p:cNvPr id="5" name="Imagem 4" descr="Recorte de Tela"/>
+          <p:cNvPicPr>
+            <a:picLocks noChangeAspect="1"/>
+          </p:cNvPicPr>
+          <p:nvPr/>
+        </p:nvPicPr>
+        <p:blipFill>
+          <a:blip r:embed="rId3">
+            <a:extLst>
+              <a:ext uri="{28A0092B-C50C-407E-A947-70E740481C1C}">
+                <a14:useLocalDpi xmlns:a14="http://schemas.microsoft.com/office/drawing/2010/main" val="0"/>
+              </a:ext>
+            </a:extLst>
+          </a:blip>
+          <a:stretch>
+            <a:fillRect/>
+          </a:stretch>
+        </p:blipFill>
+        <p:spPr>
+          <a:xfrm>
+            <a:off x="465507" y="4244907"/>
+            <a:ext cx="8567658" cy="2196835"/>
+          </a:xfrm>
+          <a:prstGeom prst="rect">
+            <a:avLst/>
+          </a:prstGeom>
+        </p:spPr>
+      </p:pic>
     </p:spTree>
     <p:extLst>
       <p:ext uri="{BB962C8B-B14F-4D97-AF65-F5344CB8AC3E}">
@@ -3760,6 +3830,375 @@
 </p:sld>
 </file>
 
+<file path=ppt/slides/slide12.xml><?xml version="1.0" encoding="utf-8"?>
+<p:sld xmlns:a="http://schemas.openxmlformats.org/drawingml/2006/main" xmlns:r="http://schemas.openxmlformats.org/officeDocument/2006/relationships" xmlns:p="http://schemas.openxmlformats.org/presentationml/2006/main">
+  <p:cSld>
+    <p:spTree>
+      <p:nvGrpSpPr>
+        <p:cNvPr id="1" name=""/>
+        <p:cNvGrpSpPr/>
+        <p:nvPr/>
+      </p:nvGrpSpPr>
+      <p:grpSpPr>
+        <a:xfrm>
+          <a:off x="0" y="0"/>
+          <a:ext cx="0" cy="0"/>
+          <a:chOff x="0" y="0"/>
+          <a:chExt cx="0" cy="0"/>
+        </a:xfrm>
+      </p:grpSpPr>
+      <p:pic>
+        <p:nvPicPr>
+          <p:cNvPr id="4" name="Espaço Reservado para Conteúdo 3" descr="Recorte de Tela"/>
+          <p:cNvPicPr>
+            <a:picLocks noGrp="1" noChangeAspect="1"/>
+          </p:cNvPicPr>
+          <p:nvPr>
+            <p:ph idx="1"/>
+          </p:nvPr>
+        </p:nvPicPr>
+        <p:blipFill>
+          <a:blip r:embed="rId2">
+            <a:extLst>
+              <a:ext uri="{28A0092B-C50C-407E-A947-70E740481C1C}">
+                <a14:useLocalDpi xmlns:a14="http://schemas.microsoft.com/office/drawing/2010/main" val="0"/>
+              </a:ext>
+            </a:extLst>
+          </a:blip>
+          <a:stretch>
+            <a:fillRect/>
+          </a:stretch>
+        </p:blipFill>
+        <p:spPr>
+          <a:xfrm>
+            <a:off x="2601836" y="2806969"/>
+            <a:ext cx="7854625" cy="1144383"/>
+          </a:xfrm>
+        </p:spPr>
+      </p:pic>
+      <p:pic>
+        <p:nvPicPr>
+          <p:cNvPr id="5" name="Imagem 4" descr="Recorte de Tela"/>
+          <p:cNvPicPr>
+            <a:picLocks noChangeAspect="1"/>
+          </p:cNvPicPr>
+          <p:nvPr/>
+        </p:nvPicPr>
+        <p:blipFill>
+          <a:blip r:embed="rId3">
+            <a:extLst>
+              <a:ext uri="{28A0092B-C50C-407E-A947-70E740481C1C}">
+                <a14:useLocalDpi xmlns:a14="http://schemas.microsoft.com/office/drawing/2010/main" val="0"/>
+              </a:ext>
+            </a:extLst>
+          </a:blip>
+          <a:stretch>
+            <a:fillRect/>
+          </a:stretch>
+        </p:blipFill>
+        <p:spPr>
+          <a:xfrm>
+            <a:off x="614149" y="4589300"/>
+            <a:ext cx="11163869" cy="951689"/>
+          </a:xfrm>
+          <a:prstGeom prst="rect">
+            <a:avLst/>
+          </a:prstGeom>
+        </p:spPr>
+      </p:pic>
+      <p:sp>
+        <p:nvSpPr>
+          <p:cNvPr id="6" name="Retângulo 5"/>
+          <p:cNvSpPr/>
+          <p:nvPr/>
+        </p:nvSpPr>
+        <p:spPr>
+          <a:xfrm>
+            <a:off x="1935707" y="674511"/>
+            <a:ext cx="8520754" cy="1815882"/>
+          </a:xfrm>
+          <a:prstGeom prst="rect">
+            <a:avLst/>
+          </a:prstGeom>
+        </p:spPr>
+        <p:txBody>
+          <a:bodyPr wrap="square">
+            <a:spAutoFit/>
+          </a:bodyPr>
+          <a:lstStyle/>
+          <a:p>
+            <a:pPr algn="just"/>
+            <a:r>
+              <a:rPr lang="pt-BR" sz="2800" b="1" dirty="0">
+                <a:solidFill>
+                  <a:srgbClr val="555555"/>
+                </a:solidFill>
+                <a:latin typeface="Arial" panose="020B0604020202020204" pitchFamily="34" charset="0"/>
+                <a:cs typeface="Arial" panose="020B0604020202020204" pitchFamily="34" charset="0"/>
+              </a:rPr>
+              <a:t>Os índices internos de validação de cluster avaliam o desempenho dos resultados levando em conta a compactação e a </a:t>
+            </a:r>
+            <a:r>
+              <a:rPr lang="pt-BR" sz="2800" b="1" dirty="0" err="1">
+                <a:solidFill>
+                  <a:srgbClr val="555555"/>
+                </a:solidFill>
+                <a:latin typeface="Arial" panose="020B0604020202020204" pitchFamily="34" charset="0"/>
+                <a:cs typeface="Arial" panose="020B0604020202020204" pitchFamily="34" charset="0"/>
+              </a:rPr>
+              <a:t>separabilidade</a:t>
+            </a:r>
+            <a:r>
+              <a:rPr lang="pt-BR" sz="2800" b="1" dirty="0">
+                <a:solidFill>
+                  <a:srgbClr val="555555"/>
+                </a:solidFill>
+                <a:latin typeface="Arial" panose="020B0604020202020204" pitchFamily="34" charset="0"/>
+                <a:cs typeface="Arial" panose="020B0604020202020204" pitchFamily="34" charset="0"/>
+              </a:rPr>
+              <a:t> dos </a:t>
+            </a:r>
+            <a:r>
+              <a:rPr lang="pt-BR" sz="2800" b="1" dirty="0" smtClean="0">
+                <a:solidFill>
+                  <a:srgbClr val="555555"/>
+                </a:solidFill>
+                <a:latin typeface="Arial" panose="020B0604020202020204" pitchFamily="34" charset="0"/>
+                <a:cs typeface="Arial" panose="020B0604020202020204" pitchFamily="34" charset="0"/>
+              </a:rPr>
+              <a:t>clusters.</a:t>
+            </a:r>
+            <a:endParaRPr lang="pt-BR" sz="2800" b="1" dirty="0">
+              <a:latin typeface="Arial" panose="020B0604020202020204" pitchFamily="34" charset="0"/>
+              <a:cs typeface="Arial" panose="020B0604020202020204" pitchFamily="34" charset="0"/>
+            </a:endParaRPr>
+          </a:p>
+        </p:txBody>
+      </p:sp>
+    </p:spTree>
+    <p:extLst>
+      <p:ext uri="{BB962C8B-B14F-4D97-AF65-F5344CB8AC3E}">
+        <p14:creationId xmlns:p14="http://schemas.microsoft.com/office/powerpoint/2010/main" val="2027923489"/>
+      </p:ext>
+    </p:extLst>
+  </p:cSld>
+  <p:clrMapOvr>
+    <a:masterClrMapping/>
+  </p:clrMapOvr>
+  <p:timing>
+    <p:tnLst>
+      <p:par>
+        <p:cTn id="1" dur="indefinite" restart="never" nodeType="tmRoot"/>
+      </p:par>
+    </p:tnLst>
+  </p:timing>
+</p:sld>
+</file>
+
+<file path=ppt/slides/slide13.xml><?xml version="1.0" encoding="utf-8"?>
+<p:sld xmlns:a="http://schemas.openxmlformats.org/drawingml/2006/main" xmlns:r="http://schemas.openxmlformats.org/officeDocument/2006/relationships" xmlns:p="http://schemas.openxmlformats.org/presentationml/2006/main">
+  <p:cSld>
+    <p:spTree>
+      <p:nvGrpSpPr>
+        <p:cNvPr id="1" name=""/>
+        <p:cNvGrpSpPr/>
+        <p:nvPr/>
+      </p:nvGrpSpPr>
+      <p:grpSpPr>
+        <a:xfrm>
+          <a:off x="0" y="0"/>
+          <a:ext cx="0" cy="0"/>
+          <a:chOff x="0" y="0"/>
+          <a:chExt cx="0" cy="0"/>
+        </a:xfrm>
+      </p:grpSpPr>
+      <p:sp>
+        <p:nvSpPr>
+          <p:cNvPr id="2" name="Título 1"/>
+          <p:cNvSpPr>
+            <a:spLocks noGrp="1"/>
+          </p:cNvSpPr>
+          <p:nvPr>
+            <p:ph type="title"/>
+          </p:nvPr>
+        </p:nvSpPr>
+        <p:spPr/>
+        <p:txBody>
+          <a:bodyPr/>
+          <a:lstStyle/>
+          <a:p>
+            <a:r>
+              <a:rPr lang="pt-BR" dirty="0" smtClean="0"/>
+              <a:t>CSPA – </a:t>
+            </a:r>
+            <a:r>
+              <a:rPr lang="pt-BR" dirty="0" err="1" smtClean="0"/>
+              <a:t>Majority</a:t>
+            </a:r>
+            <a:r>
+              <a:rPr lang="pt-BR" dirty="0" smtClean="0"/>
+              <a:t> </a:t>
+            </a:r>
+            <a:r>
+              <a:rPr lang="pt-BR" dirty="0" err="1" smtClean="0"/>
+              <a:t>Voting</a:t>
+            </a:r>
+            <a:endParaRPr lang="pt-BR" dirty="0"/>
+          </a:p>
+        </p:txBody>
+      </p:sp>
+      <p:pic>
+        <p:nvPicPr>
+          <p:cNvPr id="4" name="Espaço Reservado para Conteúdo 3" descr="Recorte de Tela"/>
+          <p:cNvPicPr>
+            <a:picLocks noGrp="1" noChangeAspect="1"/>
+          </p:cNvPicPr>
+          <p:nvPr>
+            <p:ph idx="1"/>
+          </p:nvPr>
+        </p:nvPicPr>
+        <p:blipFill>
+          <a:blip r:embed="rId2">
+            <a:extLst>
+              <a:ext uri="{28A0092B-C50C-407E-A947-70E740481C1C}">
+                <a14:useLocalDpi xmlns:a14="http://schemas.microsoft.com/office/drawing/2010/main" val="0"/>
+              </a:ext>
+            </a:extLst>
+          </a:blip>
+          <a:stretch>
+            <a:fillRect/>
+          </a:stretch>
+        </p:blipFill>
+        <p:spPr>
+          <a:xfrm>
+            <a:off x="524302" y="2876202"/>
+            <a:ext cx="5155497" cy="1873219"/>
+          </a:xfrm>
+        </p:spPr>
+      </p:pic>
+      <p:pic>
+        <p:nvPicPr>
+          <p:cNvPr id="5" name="Imagem 4" descr="Recorte de Tela"/>
+          <p:cNvPicPr>
+            <a:picLocks noChangeAspect="1"/>
+          </p:cNvPicPr>
+          <p:nvPr/>
+        </p:nvPicPr>
+        <p:blipFill>
+          <a:blip r:embed="rId3">
+            <a:extLst>
+              <a:ext uri="{28A0092B-C50C-407E-A947-70E740481C1C}">
+                <a14:useLocalDpi xmlns:a14="http://schemas.microsoft.com/office/drawing/2010/main" val="0"/>
+              </a:ext>
+            </a:extLst>
+          </a:blip>
+          <a:stretch>
+            <a:fillRect/>
+          </a:stretch>
+        </p:blipFill>
+        <p:spPr>
+          <a:xfrm>
+            <a:off x="5830314" y="3000680"/>
+            <a:ext cx="6361686" cy="1624261"/>
+          </a:xfrm>
+          <a:prstGeom prst="rect">
+            <a:avLst/>
+          </a:prstGeom>
+        </p:spPr>
+      </p:pic>
+    </p:spTree>
+    <p:extLst>
+      <p:ext uri="{BB962C8B-B14F-4D97-AF65-F5344CB8AC3E}">
+        <p14:creationId xmlns:p14="http://schemas.microsoft.com/office/powerpoint/2010/main" val="2313240880"/>
+      </p:ext>
+    </p:extLst>
+  </p:cSld>
+  <p:clrMapOvr>
+    <a:masterClrMapping/>
+  </p:clrMapOvr>
+</p:sld>
+</file>
+
+<file path=ppt/slides/slide14.xml><?xml version="1.0" encoding="utf-8"?>
+<p:sld xmlns:a="http://schemas.openxmlformats.org/drawingml/2006/main" xmlns:r="http://schemas.openxmlformats.org/officeDocument/2006/relationships" xmlns:p="http://schemas.openxmlformats.org/presentationml/2006/main">
+  <p:cSld>
+    <p:spTree>
+      <p:nvGrpSpPr>
+        <p:cNvPr id="1" name=""/>
+        <p:cNvGrpSpPr/>
+        <p:nvPr/>
+      </p:nvGrpSpPr>
+      <p:grpSpPr>
+        <a:xfrm>
+          <a:off x="0" y="0"/>
+          <a:ext cx="0" cy="0"/>
+          <a:chOff x="0" y="0"/>
+          <a:chExt cx="0" cy="0"/>
+        </a:xfrm>
+      </p:grpSpPr>
+      <p:pic>
+        <p:nvPicPr>
+          <p:cNvPr id="4" name="Espaço Reservado para Conteúdo 3"/>
+          <p:cNvPicPr>
+            <a:picLocks noGrp="1" noChangeAspect="1"/>
+          </p:cNvPicPr>
+          <p:nvPr>
+            <p:ph idx="1"/>
+          </p:nvPr>
+        </p:nvPicPr>
+        <p:blipFill>
+          <a:blip r:embed="rId2"/>
+          <a:stretch>
+            <a:fillRect/>
+          </a:stretch>
+        </p:blipFill>
+        <p:spPr>
+          <a:xfrm>
+            <a:off x="323977" y="1268095"/>
+            <a:ext cx="6117766" cy="4751144"/>
+          </a:xfrm>
+          <a:prstGeom prst="rect">
+            <a:avLst/>
+          </a:prstGeom>
+        </p:spPr>
+      </p:pic>
+      <p:pic>
+        <p:nvPicPr>
+          <p:cNvPr id="5" name="Imagem 4"/>
+          <p:cNvPicPr>
+            <a:picLocks noChangeAspect="1"/>
+          </p:cNvPicPr>
+          <p:nvPr/>
+        </p:nvPicPr>
+        <p:blipFill>
+          <a:blip r:embed="rId3"/>
+          <a:stretch>
+            <a:fillRect/>
+          </a:stretch>
+        </p:blipFill>
+        <p:spPr>
+          <a:xfrm>
+            <a:off x="6441743" y="1524619"/>
+            <a:ext cx="5457143" cy="4238095"/>
+          </a:xfrm>
+          <a:prstGeom prst="rect">
+            <a:avLst/>
+          </a:prstGeom>
+        </p:spPr>
+      </p:pic>
+    </p:spTree>
+    <p:extLst>
+      <p:ext uri="{BB962C8B-B14F-4D97-AF65-F5344CB8AC3E}">
+        <p14:creationId xmlns:p14="http://schemas.microsoft.com/office/powerpoint/2010/main" val="2920832714"/>
+      </p:ext>
+    </p:extLst>
+  </p:cSld>
+  <p:clrMapOvr>
+    <a:masterClrMapping/>
+  </p:clrMapOvr>
+</p:sld>
+</file>
+
 <file path=ppt/slides/slide2.xml><?xml version="1.0" encoding="utf-8"?>
 <p:sld xmlns:a="http://schemas.openxmlformats.org/drawingml/2006/main" xmlns:r="http://schemas.openxmlformats.org/officeDocument/2006/relationships" xmlns:p="http://schemas.openxmlformats.org/presentationml/2006/main">
   <p:cSld>
@@ -3801,15 +4240,23 @@
           <a:p>
             <a:r>
               <a:rPr lang="pt-BR" dirty="0" smtClean="0"/>
-              <a:t>O algoritmo de consenso executa vários algoritmos de agrupamento para obter um resultado. Se o algoritmo de consenso executar somente um </a:t>
+              <a:t>O algoritmo de consenso executa vários algoritmos de agrupamento para obter um resultado. Se o algoritmo de consenso </a:t>
+            </a:r>
+            <a:r>
+              <a:rPr lang="pt-BR" dirty="0" err="1" smtClean="0"/>
+              <a:t>diceR</a:t>
             </a:r>
             <a:r>
               <a:rPr lang="pt-BR" dirty="0" smtClean="0"/>
-              <a:t>algoritmo, </a:t>
+              <a:t> </a:t>
             </a:r>
             <a:r>
               <a:rPr lang="pt-BR" dirty="0" smtClean="0"/>
-              <a:t>o resultado seria o mesmo que executar ele sozinho?</a:t>
+              <a:t>executar </a:t>
+            </a:r>
+            <a:r>
+              <a:rPr lang="pt-BR" dirty="0" smtClean="0"/>
+              <a:t>somente um algoritmo, o resultado seria o mesmo que executar ele sozinho?</a:t>
             </a:r>
             <a:endParaRPr lang="pt-BR" dirty="0"/>
           </a:p>
@@ -4259,16 +4706,12 @@
           <a:p>
             <a:pPr algn="ctr"/>
             <a:r>
+              <a:rPr lang="pt-BR" dirty="0" err="1" smtClean="0"/>
+              <a:t>Majority_voting</a:t>
+            </a:r>
+            <a:r>
               <a:rPr lang="pt-BR" dirty="0" smtClean="0"/>
-              <a:t>CSPA - </a:t>
-            </a:r>
-            <a:r>
-              <a:rPr lang="pt-BR" dirty="0" err="1"/>
-              <a:t>M</a:t>
-            </a:r>
-            <a:r>
-              <a:rPr lang="pt-BR" dirty="0" err="1" smtClean="0"/>
-              <a:t>ajority_voting</a:t>
+              <a:t> - CSPA</a:t>
             </a:r>
             <a:endParaRPr lang="pt-BR" dirty="0"/>
           </a:p>
@@ -4290,7 +4733,7 @@
         </p:blipFill>
         <p:spPr>
           <a:xfrm>
-            <a:off x="6563429" y="2244151"/>
+            <a:off x="838200" y="1830530"/>
             <a:ext cx="5628571" cy="3514286"/>
           </a:xfrm>
           <a:prstGeom prst="rect">
@@ -4314,7 +4757,7 @@
         </p:blipFill>
         <p:spPr>
           <a:xfrm>
-            <a:off x="467429" y="2244151"/>
+            <a:off x="6351892" y="1930252"/>
             <a:ext cx="5628571" cy="3514286"/>
           </a:xfrm>
           <a:prstGeom prst="rect">

</xml_diff>